<commit_message>
small info for ppt
</commit_message>
<xml_diff>
--- a/Untitled 1.pptx
+++ b/Untitled 1.pptx
@@ -70,7 +70,7 @@
         <p:txBody>
           <a:bodyPr/>
           <a:p>
-            <a:fld id="{9FF91CDD-3030-4C22-AD59-C5BBB0BD3161}" type="slidenum">
+            <a:fld id="{1395A66B-08BF-470D-9EFF-B0D7A696773F}" type="slidenum">
               <a:t>&lt;#&gt;</a:t>
             </a:fld>
           </a:p>
@@ -279,7 +279,7 @@
         <p:txBody>
           <a:bodyPr/>
           <a:p>
-            <a:fld id="{0808652B-1FC7-4784-926C-FC7E66CBE6D0}" type="slidenum">
+            <a:fld id="{A91DFF98-DDED-4116-8DC0-41D910873312}" type="slidenum">
               <a:t>&lt;#&gt;</a:t>
             </a:fld>
           </a:p>
@@ -574,7 +574,7 @@
         <p:txBody>
           <a:bodyPr/>
           <a:p>
-            <a:fld id="{9269E5BA-6B8D-43DE-BD2C-19BB689CD28D}" type="slidenum">
+            <a:fld id="{C32961C7-B38A-4843-A478-EA551E2C299E}" type="slidenum">
               <a:t>&lt;#&gt;</a:t>
             </a:fld>
           </a:p>
@@ -955,7 +955,7 @@
         <p:txBody>
           <a:bodyPr/>
           <a:p>
-            <a:fld id="{B8C1C1CC-7356-4A6D-98E1-FFDAC50643C4}" type="slidenum">
+            <a:fld id="{4440BE30-16D8-44D7-AEAB-466C30DE5E35}" type="slidenum">
               <a:t>&lt;#&gt;</a:t>
             </a:fld>
           </a:p>
@@ -1038,7 +1038,7 @@
         <p:txBody>
           <a:bodyPr/>
           <a:p>
-            <a:fld id="{8120FCA7-F08A-433F-9D03-905F78FECA06}" type="slidenum">
+            <a:fld id="{9D65BA70-F100-409E-A107-B9474633732F}" type="slidenum">
               <a:t>&lt;#&gt;</a:t>
             </a:fld>
           </a:p>
@@ -1201,7 +1201,7 @@
         <p:txBody>
           <a:bodyPr/>
           <a:p>
-            <a:fld id="{A53F50D3-CEC5-4BD2-A63D-773BD7297B89}" type="slidenum">
+            <a:fld id="{56AB0548-800E-42AB-9125-2CACB2C33397}" type="slidenum">
               <a:t>&lt;#&gt;</a:t>
             </a:fld>
           </a:p>
@@ -1367,7 +1367,7 @@
         <p:txBody>
           <a:bodyPr/>
           <a:p>
-            <a:fld id="{BD61B64A-538E-4C13-A512-722031259E0E}" type="slidenum">
+            <a:fld id="{897D217E-13F5-4BF7-8560-9C2D0B7815F7}" type="slidenum">
               <a:t>&lt;#&gt;</a:t>
             </a:fld>
           </a:p>
@@ -1576,7 +1576,7 @@
         <p:txBody>
           <a:bodyPr/>
           <a:p>
-            <a:fld id="{8567E00A-3B24-42A8-A6F2-D5410C52DC55}" type="slidenum">
+            <a:fld id="{AB8EF56E-1E76-4297-9F8E-370CB3536181}" type="slidenum">
               <a:t>&lt;#&gt;</a:t>
             </a:fld>
           </a:p>
@@ -1699,7 +1699,7 @@
         <p:txBody>
           <a:bodyPr/>
           <a:p>
-            <a:fld id="{35ED1447-0118-4770-B1CA-FD7DD1A891DB}" type="slidenum">
+            <a:fld id="{DED687EF-7230-4CC0-BD50-3D6DB775A7A6}" type="slidenum">
               <a:t>&lt;#&gt;</a:t>
             </a:fld>
           </a:p>
@@ -1820,7 +1820,7 @@
         <p:txBody>
           <a:bodyPr/>
           <a:p>
-            <a:fld id="{B983658F-BDDF-49AA-9113-DC6807CD5308}" type="slidenum">
+            <a:fld id="{E89863E6-85E5-4F58-A5EF-2C0B1D2A3F9E}" type="slidenum">
               <a:t>&lt;#&gt;</a:t>
             </a:fld>
           </a:p>
@@ -2072,7 +2072,7 @@
         <p:txBody>
           <a:bodyPr/>
           <a:p>
-            <a:fld id="{3CDCF7BA-0BE4-4863-9801-4A9B31C8DA3D}" type="slidenum">
+            <a:fld id="{E3C8D2DE-2181-40C8-BAD3-317A2C05C857}" type="slidenum">
               <a:t>&lt;#&gt;</a:t>
             </a:fld>
           </a:p>
@@ -2235,7 +2235,7 @@
         <p:txBody>
           <a:bodyPr/>
           <a:p>
-            <a:fld id="{22458ED9-17DE-4A85-A648-BBC220EC0A91}" type="slidenum">
+            <a:fld id="{4ECC8D4B-4867-4E2A-8768-3C02E478E289}" type="slidenum">
               <a:t>&lt;#&gt;</a:t>
             </a:fld>
           </a:p>
@@ -2487,7 +2487,7 @@
         <p:txBody>
           <a:bodyPr/>
           <a:p>
-            <a:fld id="{EE67CB19-4786-426F-8DD5-EF5A99B9F135}" type="slidenum">
+            <a:fld id="{80FEF4B1-15DF-48B7-842E-D433F5B76804}" type="slidenum">
               <a:t>&lt;#&gt;</a:t>
             </a:fld>
           </a:p>
@@ -2739,7 +2739,7 @@
         <p:txBody>
           <a:bodyPr/>
           <a:p>
-            <a:fld id="{B88CA92E-2804-4902-86B9-9E9A557DE867}" type="slidenum">
+            <a:fld id="{041583DE-58B8-4496-901B-154FB5CB06DC}" type="slidenum">
               <a:t>&lt;#&gt;</a:t>
             </a:fld>
           </a:p>
@@ -2948,7 +2948,7 @@
         <p:txBody>
           <a:bodyPr/>
           <a:p>
-            <a:fld id="{52E22EB3-5896-47E8-AC17-B8AEB9528671}" type="slidenum">
+            <a:fld id="{09BE703F-3736-4C2D-B594-8AEAF4E97395}" type="slidenum">
               <a:t>&lt;#&gt;</a:t>
             </a:fld>
           </a:p>
@@ -3243,7 +3243,7 @@
         <p:txBody>
           <a:bodyPr/>
           <a:p>
-            <a:fld id="{77593E02-B8A0-4DA6-9C53-7B38B30F3B93}" type="slidenum">
+            <a:fld id="{A80A2612-619A-408C-9051-80E964EFE17C}" type="slidenum">
               <a:t>&lt;#&gt;</a:t>
             </a:fld>
           </a:p>
@@ -3624,7 +3624,7 @@
         <p:txBody>
           <a:bodyPr/>
           <a:p>
-            <a:fld id="{51D7A532-1EF0-4F6C-A649-B8E592F92310}" type="slidenum">
+            <a:fld id="{7616D048-44A0-4F96-B077-795EAB129A4F}" type="slidenum">
               <a:t>&lt;#&gt;</a:t>
             </a:fld>
           </a:p>
@@ -3707,7 +3707,7 @@
         <p:txBody>
           <a:bodyPr/>
           <a:p>
-            <a:fld id="{5FD48482-2D2C-4885-A6AA-1F1500AF8A37}" type="slidenum">
+            <a:fld id="{4D701388-D452-4BEC-BC7D-6DAE78F83254}" type="slidenum">
               <a:t>&lt;#&gt;</a:t>
             </a:fld>
           </a:p>
@@ -3870,7 +3870,7 @@
         <p:txBody>
           <a:bodyPr/>
           <a:p>
-            <a:fld id="{8B998EFC-8DF8-4CC3-9C8C-1FA8D3F6E968}" type="slidenum">
+            <a:fld id="{381F59A8-0F63-4EA1-8A82-F43AD6B26E31}" type="slidenum">
               <a:t>&lt;#&gt;</a:t>
             </a:fld>
           </a:p>
@@ -4036,7 +4036,7 @@
         <p:txBody>
           <a:bodyPr/>
           <a:p>
-            <a:fld id="{C1AB06F4-0C8E-4CD7-9ACC-60F1639F5535}" type="slidenum">
+            <a:fld id="{1BADA7F6-AFF8-4DBF-B0D0-304C21B6A578}" type="slidenum">
               <a:t>&lt;#&gt;</a:t>
             </a:fld>
           </a:p>
@@ -4245,7 +4245,7 @@
         <p:txBody>
           <a:bodyPr/>
           <a:p>
-            <a:fld id="{E29A4A66-CCAA-410E-9794-C17224A64C83}" type="slidenum">
+            <a:fld id="{FCBE0037-4FB6-4B9F-82AC-E72ECAC25387}" type="slidenum">
               <a:t>&lt;#&gt;</a:t>
             </a:fld>
           </a:p>
@@ -4368,7 +4368,7 @@
         <p:txBody>
           <a:bodyPr/>
           <a:p>
-            <a:fld id="{83282A66-A557-4D13-BD7E-25640D62ADED}" type="slidenum">
+            <a:fld id="{2A32A537-BA5F-4273-81EB-83C4482EF72A}" type="slidenum">
               <a:t>&lt;#&gt;</a:t>
             </a:fld>
           </a:p>
@@ -4534,7 +4534,7 @@
         <p:txBody>
           <a:bodyPr/>
           <a:p>
-            <a:fld id="{1B56DCFF-B1B3-414C-8EBB-159F806BD7E2}" type="slidenum">
+            <a:fld id="{1A22227F-C2E2-45FE-8C51-D361E1E9DCDA}" type="slidenum">
               <a:t>&lt;#&gt;</a:t>
             </a:fld>
           </a:p>
@@ -4655,7 +4655,7 @@
         <p:txBody>
           <a:bodyPr/>
           <a:p>
-            <a:fld id="{26C57CA8-0AE7-421E-BF7E-FF988F310351}" type="slidenum">
+            <a:fld id="{A21BD560-3FD7-43C0-AB9E-72F6A60A1B8E}" type="slidenum">
               <a:t>&lt;#&gt;</a:t>
             </a:fld>
           </a:p>
@@ -4907,7 +4907,7 @@
         <p:txBody>
           <a:bodyPr/>
           <a:p>
-            <a:fld id="{5B91099E-5BA3-4ADC-BD50-BF6E358E49D0}" type="slidenum">
+            <a:fld id="{D4C0A6EC-19BC-4C6C-9608-1F278BC6BD41}" type="slidenum">
               <a:t>&lt;#&gt;</a:t>
             </a:fld>
           </a:p>
@@ -5159,7 +5159,7 @@
         <p:txBody>
           <a:bodyPr/>
           <a:p>
-            <a:fld id="{110AAEC3-5D00-4F94-BFA3-57D2EC136B25}" type="slidenum">
+            <a:fld id="{C371824E-7DDA-498C-AFC1-56377A9C0788}" type="slidenum">
               <a:t>&lt;#&gt;</a:t>
             </a:fld>
           </a:p>
@@ -5411,7 +5411,7 @@
         <p:txBody>
           <a:bodyPr/>
           <a:p>
-            <a:fld id="{B5B58FCC-0F5F-4DAB-B619-B30F8F687C18}" type="slidenum">
+            <a:fld id="{73879BCD-9F50-4C29-8077-8D3A924B9D86}" type="slidenum">
               <a:t>&lt;#&gt;</a:t>
             </a:fld>
           </a:p>
@@ -5620,7 +5620,7 @@
         <p:txBody>
           <a:bodyPr/>
           <a:p>
-            <a:fld id="{2743802E-38D8-4CEB-9A8A-A385FC1A5089}" type="slidenum">
+            <a:fld id="{3EAE8266-8725-4727-BBD2-690A50C15068}" type="slidenum">
               <a:t>&lt;#&gt;</a:t>
             </a:fld>
           </a:p>
@@ -5915,7 +5915,7 @@
         <p:txBody>
           <a:bodyPr/>
           <a:p>
-            <a:fld id="{2D78ACC8-4E6D-4B5E-B9D5-04337DB0DE49}" type="slidenum">
+            <a:fld id="{138BB2B3-D81C-44DD-8094-442D3357EAD5}" type="slidenum">
               <a:t>&lt;#&gt;</a:t>
             </a:fld>
           </a:p>
@@ -6296,7 +6296,7 @@
         <p:txBody>
           <a:bodyPr/>
           <a:p>
-            <a:fld id="{ED75EF22-943D-4CBC-A59B-A592A6A7AE41}" type="slidenum">
+            <a:fld id="{4C72067E-EF7E-4B71-8204-C790E510D892}" type="slidenum">
               <a:t>&lt;#&gt;</a:t>
             </a:fld>
           </a:p>
@@ -6379,7 +6379,7 @@
         <p:txBody>
           <a:bodyPr/>
           <a:p>
-            <a:fld id="{F8874EC9-BB4D-4185-969E-A3206F39E9CF}" type="slidenum">
+            <a:fld id="{5E76E82C-3E97-4C00-B6E7-B3786B55A548}" type="slidenum">
               <a:t>&lt;#&gt;</a:t>
             </a:fld>
           </a:p>
@@ -6542,7 +6542,7 @@
         <p:txBody>
           <a:bodyPr/>
           <a:p>
-            <a:fld id="{C692574E-D9B0-4135-873B-536D3E95CAD3}" type="slidenum">
+            <a:fld id="{4F1E80F7-75F4-4E4D-86B8-25F9700B3482}" type="slidenum">
               <a:t>&lt;#&gt;</a:t>
             </a:fld>
           </a:p>
@@ -6708,7 +6708,7 @@
         <p:txBody>
           <a:bodyPr/>
           <a:p>
-            <a:fld id="{5182193D-78B9-435A-B47E-EE573E0D6F52}" type="slidenum">
+            <a:fld id="{D7717D63-EA24-4C71-AD3C-4E61BA9028FE}" type="slidenum">
               <a:t>&lt;#&gt;</a:t>
             </a:fld>
           </a:p>
@@ -6917,7 +6917,7 @@
         <p:txBody>
           <a:bodyPr/>
           <a:p>
-            <a:fld id="{0DC056D1-AAC4-4E08-986F-1BA24B746490}" type="slidenum">
+            <a:fld id="{39D3F3A6-324E-457C-8339-B534E5B524D2}" type="slidenum">
               <a:t>&lt;#&gt;</a:t>
             </a:fld>
           </a:p>
@@ -7126,7 +7126,7 @@
         <p:txBody>
           <a:bodyPr/>
           <a:p>
-            <a:fld id="{B9981538-DBDF-4B37-BFFE-B4D219BAFA15}" type="slidenum">
+            <a:fld id="{50879FEB-C087-46F7-932D-468EB1D3223A}" type="slidenum">
               <a:t>&lt;#&gt;</a:t>
             </a:fld>
           </a:p>
@@ -7249,7 +7249,7 @@
         <p:txBody>
           <a:bodyPr/>
           <a:p>
-            <a:fld id="{17A02F82-465A-46A2-85EA-CAD2ECEB5FE3}" type="slidenum">
+            <a:fld id="{B1B28997-AE84-455B-BFE8-DDA73BC6D539}" type="slidenum">
               <a:t>&lt;#&gt;</a:t>
             </a:fld>
           </a:p>
@@ -7370,7 +7370,7 @@
         <p:txBody>
           <a:bodyPr/>
           <a:p>
-            <a:fld id="{F029FEB9-253F-4E57-9BF6-1C20AF32D776}" type="slidenum">
+            <a:fld id="{CE27D2D8-58B4-4FBB-B4BE-D640140FABC8}" type="slidenum">
               <a:t>&lt;#&gt;</a:t>
             </a:fld>
           </a:p>
@@ -7622,7 +7622,7 @@
         <p:txBody>
           <a:bodyPr/>
           <a:p>
-            <a:fld id="{369C0E05-15E0-44C3-800E-DD10CD65EC2A}" type="slidenum">
+            <a:fld id="{BE32C11D-446B-44BA-9DC7-C1A3391E34D1}" type="slidenum">
               <a:t>&lt;#&gt;</a:t>
             </a:fld>
           </a:p>
@@ -7874,7 +7874,7 @@
         <p:txBody>
           <a:bodyPr/>
           <a:p>
-            <a:fld id="{0AFA2C78-3D19-4EB3-A828-5F746315BA2F}" type="slidenum">
+            <a:fld id="{758690C6-8BC9-4E74-8219-7722B2ADC82D}" type="slidenum">
               <a:t>&lt;#&gt;</a:t>
             </a:fld>
           </a:p>
@@ -8126,7 +8126,7 @@
         <p:txBody>
           <a:bodyPr/>
           <a:p>
-            <a:fld id="{2635CE08-F432-4B86-8948-D55D188955F1}" type="slidenum">
+            <a:fld id="{75938DFB-7D9B-4913-AAA1-19355C9EC782}" type="slidenum">
               <a:t>&lt;#&gt;</a:t>
             </a:fld>
           </a:p>
@@ -8335,7 +8335,7 @@
         <p:txBody>
           <a:bodyPr/>
           <a:p>
-            <a:fld id="{E5EC580B-506C-42CF-9FC0-C30E8B447CCD}" type="slidenum">
+            <a:fld id="{3B791FCE-E4E6-44ED-A04E-F178BA11BAF8}" type="slidenum">
               <a:t>&lt;#&gt;</a:t>
             </a:fld>
           </a:p>
@@ -8630,7 +8630,7 @@
         <p:txBody>
           <a:bodyPr/>
           <a:p>
-            <a:fld id="{416991CC-6CB6-4040-916A-AD92A2505EE1}" type="slidenum">
+            <a:fld id="{D6AFFFA4-CAEF-4C10-B15E-13DC08F8B32E}" type="slidenum">
               <a:t>&lt;#&gt;</a:t>
             </a:fld>
           </a:p>
@@ -9011,7 +9011,7 @@
         <p:txBody>
           <a:bodyPr/>
           <a:p>
-            <a:fld id="{9090481E-7F82-40B0-A572-AC949F7DB291}" type="slidenum">
+            <a:fld id="{31C0E2BC-E6FE-401C-B048-347CB15AAC57}" type="slidenum">
               <a:t>&lt;#&gt;</a:t>
             </a:fld>
           </a:p>
@@ -9134,7 +9134,7 @@
         <p:txBody>
           <a:bodyPr/>
           <a:p>
-            <a:fld id="{336B1D73-6305-4EFD-BB49-1B94BC06C9C6}" type="slidenum">
+            <a:fld id="{B4EFF1E5-D4EB-4802-8E0C-044A47BCAD2B}" type="slidenum">
               <a:t>&lt;#&gt;</a:t>
             </a:fld>
           </a:p>
@@ -9255,7 +9255,7 @@
         <p:txBody>
           <a:bodyPr/>
           <a:p>
-            <a:fld id="{016F14B7-EB4D-499F-B2E0-E06700CBB745}" type="slidenum">
+            <a:fld id="{F25767CF-B0C6-4A15-A698-94C6E7490320}" type="slidenum">
               <a:t>&lt;#&gt;</a:t>
             </a:fld>
           </a:p>
@@ -9507,7 +9507,7 @@
         <p:txBody>
           <a:bodyPr/>
           <a:p>
-            <a:fld id="{37D7DC0A-F5A6-49F3-A70F-5E7A50A620D6}" type="slidenum">
+            <a:fld id="{C287BD8B-75F5-4123-BFC9-F57A9F64ADA5}" type="slidenum">
               <a:t>&lt;#&gt;</a:t>
             </a:fld>
           </a:p>
@@ -9759,7 +9759,7 @@
         <p:txBody>
           <a:bodyPr/>
           <a:p>
-            <a:fld id="{30C77771-F9FC-4C7F-BBA9-9BE9E6B3C04C}" type="slidenum">
+            <a:fld id="{84985307-2D89-48AD-9DA2-25A77DB38ABA}" type="slidenum">
               <a:t>&lt;#&gt;</a:t>
             </a:fld>
           </a:p>
@@ -10011,7 +10011,7 @@
         <p:txBody>
           <a:bodyPr/>
           <a:p>
-            <a:fld id="{26ABF0A7-3B83-49C6-AD75-8F783C467A4E}" type="slidenum">
+            <a:fld id="{16848922-2686-4A55-B6FE-2E088231F019}" type="slidenum">
               <a:t>&lt;#&gt;</a:t>
             </a:fld>
           </a:p>
@@ -10564,7 +10564,7 @@
             <a:pPr indent="0" algn="r">
               <a:buNone/>
             </a:pPr>
-            <a:fld id="{CBB15AD3-7DCB-4D64-A66D-AAAD5F2EB9B4}" type="slidenum">
+            <a:fld id="{F0715FCB-19BF-46FC-95CB-DD0E247FD1B1}" type="slidenum">
               <a:rPr b="0" lang="en-US" sz="1400" spc="-1" strike="noStrike">
                 <a:solidFill>
                   <a:srgbClr val="dddddd"/>
@@ -11352,7 +11352,7 @@
             <a:pPr indent="0" algn="r">
               <a:buNone/>
             </a:pPr>
-            <a:fld id="{F372CB05-6D46-468D-AC75-2E5B452F615E}" type="slidenum">
+            <a:fld id="{B03FC4F8-931E-475A-ABD7-C9531A6F626D}" type="slidenum">
               <a:rPr b="0" lang="en-US" sz="1400" spc="-1" strike="noStrike">
                 <a:solidFill>
                   <a:srgbClr val="dddddd"/>
@@ -12456,7 +12456,7 @@
             <a:pPr indent="0" algn="r">
               <a:buNone/>
             </a:pPr>
-            <a:fld id="{54545549-6560-424B-882B-8762986E5FA5}" type="slidenum">
+            <a:fld id="{8DBC498E-CD57-404B-83DF-0DA598B3F505}" type="slidenum">
               <a:rPr b="0" lang="en-US" sz="1400" spc="-1" strike="noStrike">
                 <a:solidFill>
                   <a:srgbClr val="dddddd"/>
@@ -12893,7 +12893,7 @@
             <a:pPr indent="0" algn="r">
               <a:buNone/>
             </a:pPr>
-            <a:fld id="{6A03A0EE-36DF-4114-9C1D-9F15A1E79B95}" type="slidenum">
+            <a:fld id="{47965BF6-503D-43A3-A74D-5011871DCE1F}" type="slidenum">
               <a:rPr b="0" lang="en-US" sz="1400" spc="-1" strike="noStrike">
                 <a:solidFill>
                   <a:srgbClr val="dddddd"/>
@@ -13484,7 +13484,7 @@
         <p:txBody>
           <a:bodyPr/>
           <a:p>
-            <a:fld id="{01899324-4037-40DA-9FEB-490D7CFEE494}" type="slidenum">
+            <a:fld id="{9B449286-D496-41BE-9983-112A989D6FA4}" type="slidenum">
               <a:t>2</a:t>
             </a:fld>
           </a:p>
@@ -13597,7 +13597,7 @@
         <p:txBody>
           <a:bodyPr/>
           <a:p>
-            <a:fld id="{223A1A9A-BAE6-48AE-953E-06E05817613D}" type="slidenum">
+            <a:fld id="{28FD7716-F730-4FE1-B655-952F1A1D5A59}" type="slidenum">
               <a:t>3</a:t>
             </a:fld>
           </a:p>
@@ -13645,7 +13645,7 @@
         </p:nvSpPr>
         <p:spPr>
           <a:xfrm>
-            <a:off x="720000" y="360000"/>
+            <a:off x="732600" y="-214200"/>
             <a:ext cx="8640000" cy="900000"/>
           </a:xfrm>
           <a:prstGeom prst="rect">
@@ -13664,6 +13664,15 @@
             <a:pPr indent="0" algn="ctr">
               <a:buNone/>
             </a:pPr>
+            <a:r>
+              <a:rPr b="0" lang="en-US" sz="3000" spc="-1" strike="noStrike">
+                <a:solidFill>
+                  <a:srgbClr val="333333"/>
+                </a:solidFill>
+                <a:latin typeface="DejaVu Sans"/>
+              </a:rPr>
+              <a:t>Homepage</a:t>
+            </a:r>
             <a:endParaRPr b="0" lang="en-US" sz="3000" spc="-1" strike="noStrike">
               <a:solidFill>
                 <a:srgbClr val="333333"/>
@@ -13741,6 +13750,92 @@
       </p:pic>
       <p:sp>
         <p:nvSpPr>
+          <p:cNvPr id="195" name=""/>
+          <p:cNvSpPr/>
+          <p:nvPr/>
+        </p:nvSpPr>
+        <p:spPr>
+          <a:xfrm>
+            <a:off x="457200" y="2743200"/>
+            <a:ext cx="2057400" cy="1742040"/>
+          </a:xfrm>
+          <a:prstGeom prst="rect">
+            <a:avLst/>
+          </a:prstGeom>
+          <a:noFill/>
+          <a:ln w="18000">
+            <a:noFill/>
+          </a:ln>
+        </p:spPr>
+        <p:style>
+          <a:lnRef idx="0"/>
+          <a:fillRef idx="0"/>
+          <a:effectRef idx="0"/>
+          <a:fontRef idx="minor"/>
+        </p:style>
+        <p:txBody>
+          <a:bodyPr wrap="none" lIns="90000" rIns="90000" tIns="45000" bIns="45000" anchor="ctr">
+            <a:noAutofit/>
+          </a:bodyPr>
+          <a:p>
+            <a:endParaRPr b="0" lang="en-US" sz="1800" spc="-1" strike="noStrike">
+              <a:solidFill>
+                <a:srgbClr val="000000"/>
+              </a:solidFill>
+              <a:latin typeface="DejaVu Sans"/>
+            </a:endParaRPr>
+          </a:p>
+        </p:txBody>
+      </p:sp>
+      <p:sp>
+        <p:nvSpPr>
+          <p:cNvPr id="196" name=""/>
+          <p:cNvSpPr txBox="1"/>
+          <p:nvPr/>
+        </p:nvSpPr>
+        <p:spPr>
+          <a:xfrm>
+            <a:off x="7086600" y="1828800"/>
+            <a:ext cx="2743200" cy="1416960"/>
+          </a:xfrm>
+          <a:prstGeom prst="rect">
+            <a:avLst/>
+          </a:prstGeom>
+          <a:noFill/>
+          <a:ln w="18000">
+            <a:noFill/>
+          </a:ln>
+        </p:spPr>
+        <p:txBody>
+          <a:bodyPr lIns="90000" rIns="90000" tIns="45000" bIns="45000" anchor="t">
+            <a:noAutofit/>
+          </a:bodyPr>
+          <a:p>
+            <a:pPr algn="ctr">
+              <a:lnSpc>
+                <a:spcPct val="100000"/>
+              </a:lnSpc>
+            </a:pPr>
+            <a:r>
+              <a:rPr b="0" lang="en-US" sz="1800" spc="-1" strike="noStrike">
+                <a:solidFill>
+                  <a:srgbClr val="000000"/>
+                </a:solidFill>
+                <a:latin typeface="DejaVu Sans"/>
+              </a:rPr>
+              <a:t>Tables are represented here – the user can click on a table to go to its current active order</a:t>
+            </a:r>
+            <a:endParaRPr b="0" lang="en-US" sz="1800" spc="-1" strike="noStrike">
+              <a:solidFill>
+                <a:srgbClr val="000000"/>
+              </a:solidFill>
+              <a:latin typeface="DejaVu Sans"/>
+            </a:endParaRPr>
+          </a:p>
+        </p:txBody>
+      </p:sp>
+      <p:sp>
+        <p:nvSpPr>
           <p:cNvPr id="4" name="PlaceHolder 3"/>
           <p:cNvSpPr>
             <a:spLocks noGrp="1"/>
@@ -13753,7 +13848,7 @@
         <p:txBody>
           <a:bodyPr/>
           <a:p>
-            <a:fld id="{79A4943A-4FC7-405F-95EB-2CDE5676C31F}" type="slidenum">
+            <a:fld id="{3B83FB3E-97C3-4B35-A012-E6986E0A8FBD}" type="slidenum">
               <a:t>4</a:t>
             </a:fld>
           </a:p>
@@ -13791,7 +13886,7 @@
       </p:grpSpPr>
       <p:sp>
         <p:nvSpPr>
-          <p:cNvPr id="195" name="PlaceHolder 1"/>
+          <p:cNvPr id="197" name="PlaceHolder 1"/>
           <p:cNvSpPr>
             <a:spLocks noGrp="1"/>
           </p:cNvSpPr>
@@ -13801,7 +13896,7 @@
         </p:nvSpPr>
         <p:spPr>
           <a:xfrm>
-            <a:off x="720000" y="360000"/>
+            <a:off x="744480" y="-164520"/>
             <a:ext cx="8640000" cy="900000"/>
           </a:xfrm>
           <a:prstGeom prst="rect">
@@ -13820,6 +13915,15 @@
             <a:pPr indent="0" algn="ctr">
               <a:buNone/>
             </a:pPr>
+            <a:r>
+              <a:rPr b="0" lang="en-US" sz="3000" spc="-1" strike="noStrike">
+                <a:solidFill>
+                  <a:srgbClr val="333333"/>
+                </a:solidFill>
+                <a:latin typeface="DejaVu Sans"/>
+              </a:rPr>
+              <a:t>Order List</a:t>
+            </a:r>
             <a:endParaRPr b="0" lang="en-US" sz="3000" spc="-1" strike="noStrike">
               <a:solidFill>
                 <a:srgbClr val="333333"/>
@@ -13831,7 +13935,7 @@
       </p:sp>
       <p:sp>
         <p:nvSpPr>
-          <p:cNvPr id="196" name="PlaceHolder 2"/>
+          <p:cNvPr id="198" name="PlaceHolder 2"/>
           <p:cNvSpPr>
             <a:spLocks noGrp="1"/>
           </p:cNvSpPr>
@@ -13874,7 +13978,7 @@
       </p:sp>
       <p:pic>
         <p:nvPicPr>
-          <p:cNvPr id="197" name="" descr=""/>
+          <p:cNvPr id="199" name="" descr=""/>
           <p:cNvPicPr/>
           <p:nvPr/>
         </p:nvPicPr>
@@ -13897,6 +14001,132 @@
       </p:pic>
       <p:sp>
         <p:nvSpPr>
+          <p:cNvPr id="200" name=""/>
+          <p:cNvSpPr txBox="1"/>
+          <p:nvPr/>
+        </p:nvSpPr>
+        <p:spPr>
+          <a:xfrm>
+            <a:off x="3657600" y="735480"/>
+            <a:ext cx="2514600" cy="1151640"/>
+          </a:xfrm>
+          <a:prstGeom prst="rect">
+            <a:avLst/>
+          </a:prstGeom>
+          <a:noFill/>
+          <a:ln w="18000">
+            <a:noFill/>
+          </a:ln>
+        </p:spPr>
+        <p:txBody>
+          <a:bodyPr lIns="90000" rIns="90000" tIns="45000" bIns="45000" anchor="t">
+            <a:noAutofit/>
+          </a:bodyPr>
+          <a:p>
+            <a:r>
+              <a:rPr b="0" lang="en-US" sz="1800" spc="-1" strike="noStrike">
+                <a:solidFill>
+                  <a:srgbClr val="000000"/>
+                </a:solidFill>
+                <a:latin typeface="DejaVu Sans"/>
+              </a:rPr>
+              <a:t>The main page that users will access. Allows control over registered orders.</a:t>
+            </a:r>
+            <a:endParaRPr b="0" lang="en-US" sz="1800" spc="-1" strike="noStrike">
+              <a:solidFill>
+                <a:srgbClr val="000000"/>
+              </a:solidFill>
+              <a:latin typeface="DejaVu Sans"/>
+            </a:endParaRPr>
+          </a:p>
+        </p:txBody>
+      </p:sp>
+      <p:sp>
+        <p:nvSpPr>
+          <p:cNvPr id="201" name=""/>
+          <p:cNvSpPr txBox="1"/>
+          <p:nvPr/>
+        </p:nvSpPr>
+        <p:spPr>
+          <a:xfrm>
+            <a:off x="2971800" y="2296440"/>
+            <a:ext cx="6172200" cy="2743560"/>
+          </a:xfrm>
+          <a:prstGeom prst="rect">
+            <a:avLst/>
+          </a:prstGeom>
+          <a:noFill/>
+          <a:ln w="18000">
+            <a:noFill/>
+          </a:ln>
+        </p:spPr>
+        <p:txBody>
+          <a:bodyPr lIns="90000" rIns="90000" tIns="45000" bIns="45000" anchor="t">
+            <a:noAutofit/>
+          </a:bodyPr>
+          <a:p>
+            <a:r>
+              <a:rPr b="0" lang="en-US" sz="1800" spc="-1" strike="noStrike">
+                <a:solidFill>
+                  <a:srgbClr val="000000"/>
+                </a:solidFill>
+                <a:latin typeface="DejaVu Sans"/>
+              </a:rPr>
+              <a:t>Once an order is clicked, information can be viewed here. The tabs on the top allow navigation of different tiers of actions and information.</a:t>
+            </a:r>
+            <a:endParaRPr b="0" lang="en-US" sz="1800" spc="-1" strike="noStrike">
+              <a:solidFill>
+                <a:srgbClr val="000000"/>
+              </a:solidFill>
+              <a:latin typeface="DejaVu Sans"/>
+            </a:endParaRPr>
+          </a:p>
+        </p:txBody>
+      </p:sp>
+      <p:sp>
+        <p:nvSpPr>
+          <p:cNvPr id="202" name=""/>
+          <p:cNvSpPr txBox="1"/>
+          <p:nvPr/>
+        </p:nvSpPr>
+        <p:spPr>
+          <a:xfrm>
+            <a:off x="457200" y="5130720"/>
+            <a:ext cx="8915400" cy="355680"/>
+          </a:xfrm>
+          <a:prstGeom prst="rect">
+            <a:avLst/>
+          </a:prstGeom>
+          <a:noFill/>
+          <a:ln w="18000">
+            <a:noFill/>
+          </a:ln>
+        </p:spPr>
+        <p:txBody>
+          <a:bodyPr lIns="90000" rIns="90000" tIns="45000" bIns="45000" anchor="t">
+            <a:noAutofit/>
+          </a:bodyPr>
+          <a:p>
+            <a:r>
+              <a:rPr b="0" lang="en-US" sz="1800" spc="-1" strike="noStrike">
+                <a:solidFill>
+                  <a:srgbClr val="000000"/>
+                </a:solidFill>
+                <a:latin typeface="DejaVu Sans"/>
+              </a:rPr>
+              <a:t>Orders are displayed in a brief table under the order details widget</a:t>
+            </a:r>
+            <a:endParaRPr b="0" lang="en-US" sz="1800" spc="-1" strike="noStrike">
+              <a:solidFill>
+                <a:srgbClr val="000000"/>
+              </a:solidFill>
+              <a:latin typeface="DejaVu Sans"/>
+            </a:endParaRPr>
+          </a:p>
+        </p:txBody>
+      </p:sp>
+      <p:sp>
+        <p:nvSpPr>
           <p:cNvPr id="4" name="PlaceHolder 3"/>
           <p:cNvSpPr>
             <a:spLocks noGrp="1"/>
@@ -13909,7 +14139,7 @@
         <p:txBody>
           <a:bodyPr/>
           <a:p>
-            <a:fld id="{B3A2089F-D002-4A4D-B718-556455F97E8B}" type="slidenum">
+            <a:fld id="{E9CDC131-0D5D-4F33-8F32-57F3C304826F}" type="slidenum">
               <a:t>5</a:t>
             </a:fld>
           </a:p>

</xml_diff>

<commit_message>
new page for user goals
</commit_message>
<xml_diff>
--- a/Untitled 1.pptx
+++ b/Untitled 1.pptx
@@ -13,6 +13,7 @@
     <p:sldId id="258" r:id="rId8"/>
     <p:sldId id="259" r:id="rId9"/>
     <p:sldId id="260" r:id="rId10"/>
+    <p:sldId id="261" r:id="rId11"/>
   </p:sldIdLst>
   <p:sldSz cx="10080625" cy="5670550"/>
   <p:notesSz cx="7772400" cy="10058400"/>
@@ -70,7 +71,7 @@
         <p:txBody>
           <a:bodyPr/>
           <a:p>
-            <a:fld id="{1395A66B-08BF-470D-9EFF-B0D7A696773F}" type="slidenum">
+            <a:fld id="{BA794201-E756-43AA-B859-4AF7C318A166}" type="slidenum">
               <a:t>&lt;#&gt;</a:t>
             </a:fld>
           </a:p>
@@ -279,7 +280,7 @@
         <p:txBody>
           <a:bodyPr/>
           <a:p>
-            <a:fld id="{A91DFF98-DDED-4116-8DC0-41D910873312}" type="slidenum">
+            <a:fld id="{73585CB8-93E4-4F61-8089-F60BB7BE418A}" type="slidenum">
               <a:t>&lt;#&gt;</a:t>
             </a:fld>
           </a:p>
@@ -574,7 +575,7 @@
         <p:txBody>
           <a:bodyPr/>
           <a:p>
-            <a:fld id="{C32961C7-B38A-4843-A478-EA551E2C299E}" type="slidenum">
+            <a:fld id="{EC96CD3E-06CA-461D-8280-9777BC6864EE}" type="slidenum">
               <a:t>&lt;#&gt;</a:t>
             </a:fld>
           </a:p>
@@ -955,7 +956,7 @@
         <p:txBody>
           <a:bodyPr/>
           <a:p>
-            <a:fld id="{4440BE30-16D8-44D7-AEAB-466C30DE5E35}" type="slidenum">
+            <a:fld id="{13739CFE-90AD-4722-9FF0-39590D0367B9}" type="slidenum">
               <a:t>&lt;#&gt;</a:t>
             </a:fld>
           </a:p>
@@ -1038,7 +1039,7 @@
         <p:txBody>
           <a:bodyPr/>
           <a:p>
-            <a:fld id="{9D65BA70-F100-409E-A107-B9474633732F}" type="slidenum">
+            <a:fld id="{E7346A51-BC64-42F9-A8D1-11220B2BC34E}" type="slidenum">
               <a:t>&lt;#&gt;</a:t>
             </a:fld>
           </a:p>
@@ -1201,7 +1202,7 @@
         <p:txBody>
           <a:bodyPr/>
           <a:p>
-            <a:fld id="{56AB0548-800E-42AB-9125-2CACB2C33397}" type="slidenum">
+            <a:fld id="{72120557-D315-4F21-B319-68E540FF8991}" type="slidenum">
               <a:t>&lt;#&gt;</a:t>
             </a:fld>
           </a:p>
@@ -1367,7 +1368,7 @@
         <p:txBody>
           <a:bodyPr/>
           <a:p>
-            <a:fld id="{897D217E-13F5-4BF7-8560-9C2D0B7815F7}" type="slidenum">
+            <a:fld id="{4A526F11-A812-41C9-BF92-A342E7121689}" type="slidenum">
               <a:t>&lt;#&gt;</a:t>
             </a:fld>
           </a:p>
@@ -1576,7 +1577,7 @@
         <p:txBody>
           <a:bodyPr/>
           <a:p>
-            <a:fld id="{AB8EF56E-1E76-4297-9F8E-370CB3536181}" type="slidenum">
+            <a:fld id="{FAB14D1A-1C1A-4536-9CBF-B4F4C5377BFF}" type="slidenum">
               <a:t>&lt;#&gt;</a:t>
             </a:fld>
           </a:p>
@@ -1699,7 +1700,7 @@
         <p:txBody>
           <a:bodyPr/>
           <a:p>
-            <a:fld id="{DED687EF-7230-4CC0-BD50-3D6DB775A7A6}" type="slidenum">
+            <a:fld id="{EC07BD2B-D37C-4B80-A417-A0FFA9008692}" type="slidenum">
               <a:t>&lt;#&gt;</a:t>
             </a:fld>
           </a:p>
@@ -1820,7 +1821,7 @@
         <p:txBody>
           <a:bodyPr/>
           <a:p>
-            <a:fld id="{E89863E6-85E5-4F58-A5EF-2C0B1D2A3F9E}" type="slidenum">
+            <a:fld id="{884D1709-E6C2-4699-BDA9-F409E714BD36}" type="slidenum">
               <a:t>&lt;#&gt;</a:t>
             </a:fld>
           </a:p>
@@ -2072,7 +2073,7 @@
         <p:txBody>
           <a:bodyPr/>
           <a:p>
-            <a:fld id="{E3C8D2DE-2181-40C8-BAD3-317A2C05C857}" type="slidenum">
+            <a:fld id="{3DAD3B41-AC4E-46B7-8E31-0F2173E9162F}" type="slidenum">
               <a:t>&lt;#&gt;</a:t>
             </a:fld>
           </a:p>
@@ -2235,7 +2236,7 @@
         <p:txBody>
           <a:bodyPr/>
           <a:p>
-            <a:fld id="{4ECC8D4B-4867-4E2A-8768-3C02E478E289}" type="slidenum">
+            <a:fld id="{D5113831-5CFC-465B-9F65-627F35F9D6D7}" type="slidenum">
               <a:t>&lt;#&gt;</a:t>
             </a:fld>
           </a:p>
@@ -2487,7 +2488,7 @@
         <p:txBody>
           <a:bodyPr/>
           <a:p>
-            <a:fld id="{80FEF4B1-15DF-48B7-842E-D433F5B76804}" type="slidenum">
+            <a:fld id="{CC2EAC3E-0A55-4C60-9B21-B5CDD1F53D7F}" type="slidenum">
               <a:t>&lt;#&gt;</a:t>
             </a:fld>
           </a:p>
@@ -2739,7 +2740,7 @@
         <p:txBody>
           <a:bodyPr/>
           <a:p>
-            <a:fld id="{041583DE-58B8-4496-901B-154FB5CB06DC}" type="slidenum">
+            <a:fld id="{EC73EEEA-52E0-4A9E-8D8E-1899D2217EB5}" type="slidenum">
               <a:t>&lt;#&gt;</a:t>
             </a:fld>
           </a:p>
@@ -2948,7 +2949,7 @@
         <p:txBody>
           <a:bodyPr/>
           <a:p>
-            <a:fld id="{09BE703F-3736-4C2D-B594-8AEAF4E97395}" type="slidenum">
+            <a:fld id="{0E97FCDE-E8BF-4CBD-9140-E8605B491247}" type="slidenum">
               <a:t>&lt;#&gt;</a:t>
             </a:fld>
           </a:p>
@@ -3243,7 +3244,7 @@
         <p:txBody>
           <a:bodyPr/>
           <a:p>
-            <a:fld id="{A80A2612-619A-408C-9051-80E964EFE17C}" type="slidenum">
+            <a:fld id="{84964840-4990-4428-9DF7-6AE1773B40F6}" type="slidenum">
               <a:t>&lt;#&gt;</a:t>
             </a:fld>
           </a:p>
@@ -3624,7 +3625,7 @@
         <p:txBody>
           <a:bodyPr/>
           <a:p>
-            <a:fld id="{7616D048-44A0-4F96-B077-795EAB129A4F}" type="slidenum">
+            <a:fld id="{5B98C8DF-9A55-49D0-BAA3-51F3AE36A3AF}" type="slidenum">
               <a:t>&lt;#&gt;</a:t>
             </a:fld>
           </a:p>
@@ -3707,7 +3708,7 @@
         <p:txBody>
           <a:bodyPr/>
           <a:p>
-            <a:fld id="{4D701388-D452-4BEC-BC7D-6DAE78F83254}" type="slidenum">
+            <a:fld id="{C9364C88-004B-42C7-9E1A-408E229C1D12}" type="slidenum">
               <a:t>&lt;#&gt;</a:t>
             </a:fld>
           </a:p>
@@ -3870,7 +3871,7 @@
         <p:txBody>
           <a:bodyPr/>
           <a:p>
-            <a:fld id="{381F59A8-0F63-4EA1-8A82-F43AD6B26E31}" type="slidenum">
+            <a:fld id="{E76494E8-2327-42F2-A5CD-23F2FACE5FD5}" type="slidenum">
               <a:t>&lt;#&gt;</a:t>
             </a:fld>
           </a:p>
@@ -4036,7 +4037,7 @@
         <p:txBody>
           <a:bodyPr/>
           <a:p>
-            <a:fld id="{1BADA7F6-AFF8-4DBF-B0D0-304C21B6A578}" type="slidenum">
+            <a:fld id="{2F67C11C-3C2A-4461-A16F-613381BFAB3A}" type="slidenum">
               <a:t>&lt;#&gt;</a:t>
             </a:fld>
           </a:p>
@@ -4245,7 +4246,7 @@
         <p:txBody>
           <a:bodyPr/>
           <a:p>
-            <a:fld id="{FCBE0037-4FB6-4B9F-82AC-E72ECAC25387}" type="slidenum">
+            <a:fld id="{39A9C767-8DEC-40D3-A39C-64970E0D7C75}" type="slidenum">
               <a:t>&lt;#&gt;</a:t>
             </a:fld>
           </a:p>
@@ -4368,7 +4369,7 @@
         <p:txBody>
           <a:bodyPr/>
           <a:p>
-            <a:fld id="{2A32A537-BA5F-4273-81EB-83C4482EF72A}" type="slidenum">
+            <a:fld id="{4A2EC51A-F7BF-4A7B-8BF3-63DB96DE6F3C}" type="slidenum">
               <a:t>&lt;#&gt;</a:t>
             </a:fld>
           </a:p>
@@ -4534,7 +4535,7 @@
         <p:txBody>
           <a:bodyPr/>
           <a:p>
-            <a:fld id="{1A22227F-C2E2-45FE-8C51-D361E1E9DCDA}" type="slidenum">
+            <a:fld id="{C5CA465D-E0AE-4BA4-90E7-57627A82F038}" type="slidenum">
               <a:t>&lt;#&gt;</a:t>
             </a:fld>
           </a:p>
@@ -4655,7 +4656,7 @@
         <p:txBody>
           <a:bodyPr/>
           <a:p>
-            <a:fld id="{A21BD560-3FD7-43C0-AB9E-72F6A60A1B8E}" type="slidenum">
+            <a:fld id="{A06B97D1-EEF2-4EB5-A1A0-574098A667E8}" type="slidenum">
               <a:t>&lt;#&gt;</a:t>
             </a:fld>
           </a:p>
@@ -4907,7 +4908,7 @@
         <p:txBody>
           <a:bodyPr/>
           <a:p>
-            <a:fld id="{D4C0A6EC-19BC-4C6C-9608-1F278BC6BD41}" type="slidenum">
+            <a:fld id="{C0BA6916-7C1A-4F44-8081-774D09052AA0}" type="slidenum">
               <a:t>&lt;#&gt;</a:t>
             </a:fld>
           </a:p>
@@ -5159,7 +5160,7 @@
         <p:txBody>
           <a:bodyPr/>
           <a:p>
-            <a:fld id="{C371824E-7DDA-498C-AFC1-56377A9C0788}" type="slidenum">
+            <a:fld id="{BF1DDAAC-1055-4210-AF1C-C5A28DD335F6}" type="slidenum">
               <a:t>&lt;#&gt;</a:t>
             </a:fld>
           </a:p>
@@ -5411,7 +5412,7 @@
         <p:txBody>
           <a:bodyPr/>
           <a:p>
-            <a:fld id="{73879BCD-9F50-4C29-8077-8D3A924B9D86}" type="slidenum">
+            <a:fld id="{9F1D9D0C-1D8E-41E6-A677-B9BE2D5AF0F1}" type="slidenum">
               <a:t>&lt;#&gt;</a:t>
             </a:fld>
           </a:p>
@@ -5620,7 +5621,7 @@
         <p:txBody>
           <a:bodyPr/>
           <a:p>
-            <a:fld id="{3EAE8266-8725-4727-BBD2-690A50C15068}" type="slidenum">
+            <a:fld id="{DCEA5397-42AB-4951-B93F-8E4ED81CA47A}" type="slidenum">
               <a:t>&lt;#&gt;</a:t>
             </a:fld>
           </a:p>
@@ -5915,7 +5916,7 @@
         <p:txBody>
           <a:bodyPr/>
           <a:p>
-            <a:fld id="{138BB2B3-D81C-44DD-8094-442D3357EAD5}" type="slidenum">
+            <a:fld id="{12467851-5AA1-4C48-A668-95AB98EF5419}" type="slidenum">
               <a:t>&lt;#&gt;</a:t>
             </a:fld>
           </a:p>
@@ -6296,7 +6297,7 @@
         <p:txBody>
           <a:bodyPr/>
           <a:p>
-            <a:fld id="{4C72067E-EF7E-4B71-8204-C790E510D892}" type="slidenum">
+            <a:fld id="{39E0A9D7-B4A0-4A40-9F51-DC5F1361C15E}" type="slidenum">
               <a:t>&lt;#&gt;</a:t>
             </a:fld>
           </a:p>
@@ -6379,7 +6380,7 @@
         <p:txBody>
           <a:bodyPr/>
           <a:p>
-            <a:fld id="{5E76E82C-3E97-4C00-B6E7-B3786B55A548}" type="slidenum">
+            <a:fld id="{A7DA5FC4-CCC4-4253-842F-5488FF2D5363}" type="slidenum">
               <a:t>&lt;#&gt;</a:t>
             </a:fld>
           </a:p>
@@ -6542,7 +6543,7 @@
         <p:txBody>
           <a:bodyPr/>
           <a:p>
-            <a:fld id="{4F1E80F7-75F4-4E4D-86B8-25F9700B3482}" type="slidenum">
+            <a:fld id="{0BF0CCA5-8109-4A93-9AD5-006587AF6809}" type="slidenum">
               <a:t>&lt;#&gt;</a:t>
             </a:fld>
           </a:p>
@@ -6708,7 +6709,7 @@
         <p:txBody>
           <a:bodyPr/>
           <a:p>
-            <a:fld id="{D7717D63-EA24-4C71-AD3C-4E61BA9028FE}" type="slidenum">
+            <a:fld id="{12BD5A56-F6B9-4815-A648-B1A2851DEF9B}" type="slidenum">
               <a:t>&lt;#&gt;</a:t>
             </a:fld>
           </a:p>
@@ -6917,7 +6918,7 @@
         <p:txBody>
           <a:bodyPr/>
           <a:p>
-            <a:fld id="{39D3F3A6-324E-457C-8339-B534E5B524D2}" type="slidenum">
+            <a:fld id="{DFE52BDF-D2C2-40FC-9EB2-4BFB09212635}" type="slidenum">
               <a:t>&lt;#&gt;</a:t>
             </a:fld>
           </a:p>
@@ -7126,7 +7127,7 @@
         <p:txBody>
           <a:bodyPr/>
           <a:p>
-            <a:fld id="{50879FEB-C087-46F7-932D-468EB1D3223A}" type="slidenum">
+            <a:fld id="{169E07CF-D18C-46A7-873B-22C0268747D5}" type="slidenum">
               <a:t>&lt;#&gt;</a:t>
             </a:fld>
           </a:p>
@@ -7249,7 +7250,7 @@
         <p:txBody>
           <a:bodyPr/>
           <a:p>
-            <a:fld id="{B1B28997-AE84-455B-BFE8-DDA73BC6D539}" type="slidenum">
+            <a:fld id="{89E70724-067B-4A37-AF48-7A109F4B5EE1}" type="slidenum">
               <a:t>&lt;#&gt;</a:t>
             </a:fld>
           </a:p>
@@ -7370,7 +7371,7 @@
         <p:txBody>
           <a:bodyPr/>
           <a:p>
-            <a:fld id="{CE27D2D8-58B4-4FBB-B4BE-D640140FABC8}" type="slidenum">
+            <a:fld id="{B9CD3D97-BA67-4C13-A7E6-0E08DAFBB786}" type="slidenum">
               <a:t>&lt;#&gt;</a:t>
             </a:fld>
           </a:p>
@@ -7622,7 +7623,7 @@
         <p:txBody>
           <a:bodyPr/>
           <a:p>
-            <a:fld id="{BE32C11D-446B-44BA-9DC7-C1A3391E34D1}" type="slidenum">
+            <a:fld id="{3318D8A4-CAA9-470E-89BF-4A2FCFC040E4}" type="slidenum">
               <a:t>&lt;#&gt;</a:t>
             </a:fld>
           </a:p>
@@ -7874,7 +7875,7 @@
         <p:txBody>
           <a:bodyPr/>
           <a:p>
-            <a:fld id="{758690C6-8BC9-4E74-8219-7722B2ADC82D}" type="slidenum">
+            <a:fld id="{B78DC679-8A78-4FDB-95FB-AB2DD8F9658A}" type="slidenum">
               <a:t>&lt;#&gt;</a:t>
             </a:fld>
           </a:p>
@@ -8126,7 +8127,7 @@
         <p:txBody>
           <a:bodyPr/>
           <a:p>
-            <a:fld id="{75938DFB-7D9B-4913-AAA1-19355C9EC782}" type="slidenum">
+            <a:fld id="{94108944-A8F5-4E64-8B10-C8D592984AA9}" type="slidenum">
               <a:t>&lt;#&gt;</a:t>
             </a:fld>
           </a:p>
@@ -8335,7 +8336,7 @@
         <p:txBody>
           <a:bodyPr/>
           <a:p>
-            <a:fld id="{3B791FCE-E4E6-44ED-A04E-F178BA11BAF8}" type="slidenum">
+            <a:fld id="{4A487135-C1F3-40A7-8B3A-C2BCF48028BA}" type="slidenum">
               <a:t>&lt;#&gt;</a:t>
             </a:fld>
           </a:p>
@@ -8630,7 +8631,7 @@
         <p:txBody>
           <a:bodyPr/>
           <a:p>
-            <a:fld id="{D6AFFFA4-CAEF-4C10-B15E-13DC08F8B32E}" type="slidenum">
+            <a:fld id="{9D65A4F1-064A-47E0-88FE-41DB5E47F050}" type="slidenum">
               <a:t>&lt;#&gt;</a:t>
             </a:fld>
           </a:p>
@@ -9011,7 +9012,7 @@
         <p:txBody>
           <a:bodyPr/>
           <a:p>
-            <a:fld id="{31C0E2BC-E6FE-401C-B048-347CB15AAC57}" type="slidenum">
+            <a:fld id="{B34DB3EB-0C14-4184-A065-9305F8EDCF1B}" type="slidenum">
               <a:t>&lt;#&gt;</a:t>
             </a:fld>
           </a:p>
@@ -9134,7 +9135,7 @@
         <p:txBody>
           <a:bodyPr/>
           <a:p>
-            <a:fld id="{B4EFF1E5-D4EB-4802-8E0C-044A47BCAD2B}" type="slidenum">
+            <a:fld id="{F1112078-B04D-444D-B596-D20A25195E1B}" type="slidenum">
               <a:t>&lt;#&gt;</a:t>
             </a:fld>
           </a:p>
@@ -9255,7 +9256,7 @@
         <p:txBody>
           <a:bodyPr/>
           <a:p>
-            <a:fld id="{F25767CF-B0C6-4A15-A698-94C6E7490320}" type="slidenum">
+            <a:fld id="{236F9F52-0BBE-43D8-970E-3418A82FD3CB}" type="slidenum">
               <a:t>&lt;#&gt;</a:t>
             </a:fld>
           </a:p>
@@ -9507,7 +9508,7 @@
         <p:txBody>
           <a:bodyPr/>
           <a:p>
-            <a:fld id="{C287BD8B-75F5-4123-BFC9-F57A9F64ADA5}" type="slidenum">
+            <a:fld id="{A6EBE0E3-F991-42FD-B25A-C9885E10B8A3}" type="slidenum">
               <a:t>&lt;#&gt;</a:t>
             </a:fld>
           </a:p>
@@ -9759,7 +9760,7 @@
         <p:txBody>
           <a:bodyPr/>
           <a:p>
-            <a:fld id="{84985307-2D89-48AD-9DA2-25A77DB38ABA}" type="slidenum">
+            <a:fld id="{D725127D-902D-4D93-8A61-B40BEC23874A}" type="slidenum">
               <a:t>&lt;#&gt;</a:t>
             </a:fld>
           </a:p>
@@ -10011,7 +10012,7 @@
         <p:txBody>
           <a:bodyPr/>
           <a:p>
-            <a:fld id="{16848922-2686-4A55-B6FE-2E088231F019}" type="slidenum">
+            <a:fld id="{76AE22F8-7DFC-47D7-915A-4F5AFCC0BABA}" type="slidenum">
               <a:t>&lt;#&gt;</a:t>
             </a:fld>
           </a:p>
@@ -10564,7 +10565,7 @@
             <a:pPr indent="0" algn="r">
               <a:buNone/>
             </a:pPr>
-            <a:fld id="{F0715FCB-19BF-46FC-95CB-DD0E247FD1B1}" type="slidenum">
+            <a:fld id="{F9F4B37D-8F53-4D81-BDC4-FC8231D20118}" type="slidenum">
               <a:rPr b="0" lang="en-US" sz="1400" spc="-1" strike="noStrike">
                 <a:solidFill>
                   <a:srgbClr val="dddddd"/>
@@ -11352,7 +11353,7 @@
             <a:pPr indent="0" algn="r">
               <a:buNone/>
             </a:pPr>
-            <a:fld id="{B03FC4F8-931E-475A-ABD7-C9531A6F626D}" type="slidenum">
+            <a:fld id="{E6B63E81-8853-4BFF-A94D-BD081F25B12C}" type="slidenum">
               <a:rPr b="0" lang="en-US" sz="1400" spc="-1" strike="noStrike">
                 <a:solidFill>
                   <a:srgbClr val="dddddd"/>
@@ -11437,7 +11438,11 @@
           <a:prstGeom prst="rect">
             <a:avLst/>
           </a:prstGeom>
-          <a:noFill/>
+          <a:solidFill>
+            <a:srgbClr val="ffffff">
+              <a:alpha val="50000"/>
+            </a:srgbClr>
+          </a:solidFill>
           <a:ln w="0">
             <a:noFill/>
           </a:ln>
@@ -12456,7 +12461,7 @@
             <a:pPr indent="0" algn="r">
               <a:buNone/>
             </a:pPr>
-            <a:fld id="{8DBC498E-CD57-404B-83DF-0DA598B3F505}" type="slidenum">
+            <a:fld id="{A961BA74-616B-4F20-8D7B-E30D23B8AE03}" type="slidenum">
               <a:rPr b="0" lang="en-US" sz="1400" spc="-1" strike="noStrike">
                 <a:solidFill>
                   <a:srgbClr val="dddddd"/>
@@ -12893,7 +12898,7 @@
             <a:pPr indent="0" algn="r">
               <a:buNone/>
             </a:pPr>
-            <a:fld id="{47965BF6-503D-43A3-A74D-5011871DCE1F}" type="slidenum">
+            <a:fld id="{95FE92F8-BEDC-4B23-A974-EC05D96BCBAC}" type="slidenum">
               <a:rPr b="0" lang="en-US" sz="1400" spc="-1" strike="noStrike">
                 <a:solidFill>
                   <a:srgbClr val="dddddd"/>
@@ -13436,7 +13441,11 @@
           <a:prstGeom prst="rect">
             <a:avLst/>
           </a:prstGeom>
-          <a:noFill/>
+          <a:solidFill>
+            <a:srgbClr val="ffffff">
+              <a:alpha val="50000"/>
+            </a:srgbClr>
+          </a:solidFill>
           <a:ln w="0">
             <a:noFill/>
           </a:ln>
@@ -13459,7 +13468,34 @@
                 </a:solidFill>
                 <a:latin typeface="DejaVu Sans"/>
               </a:rPr>
-              <a:t>OrderMaster is a simple, intuitive program that allows owners and employees of a restaurant business to manage their orders. It also has functionality to manage servers or waiters, menu items, and tables.</a:t>
+              <a:t>OrderMaster is a simple, intuitive program that allows owners </a:t>
+            </a:r>
+            <a:r>
+              <a:rPr b="0" lang="en-US" sz="2000" spc="-1" strike="noStrike">
+                <a:solidFill>
+                  <a:srgbClr val="666666"/>
+                </a:solidFill>
+                <a:latin typeface="DejaVu Sans"/>
+              </a:rPr>
+              <a:t>and employees of a restaurant business to manage their </a:t>
+            </a:r>
+            <a:r>
+              <a:rPr b="0" lang="en-US" sz="2000" spc="-1" strike="noStrike">
+                <a:solidFill>
+                  <a:srgbClr val="666666"/>
+                </a:solidFill>
+                <a:latin typeface="DejaVu Sans"/>
+              </a:rPr>
+              <a:t>orders. It also has functionality to manage servers or waiters, </a:t>
+            </a:r>
+            <a:r>
+              <a:rPr b="0" lang="en-US" sz="2000" spc="-1" strike="noStrike">
+                <a:solidFill>
+                  <a:srgbClr val="666666"/>
+                </a:solidFill>
+                <a:latin typeface="DejaVu Sans"/>
+              </a:rPr>
+              <a:t>menu items, and tables.</a:t>
             </a:r>
             <a:endParaRPr b="0" lang="en-US" sz="2000" spc="-1" strike="noStrike">
               <a:solidFill>
@@ -13484,7 +13520,7 @@
         <p:txBody>
           <a:bodyPr/>
           <a:p>
-            <a:fld id="{9B449286-D496-41BE-9983-112A989D6FA4}" type="slidenum">
+            <a:fld id="{5A477FB4-CFC7-4BE3-AA2E-2E1A3A7478EB}" type="slidenum">
               <a:t>2</a:t>
             </a:fld>
           </a:p>
@@ -13532,8 +13568,8 @@
         </p:nvSpPr>
         <p:spPr>
           <a:xfrm>
-            <a:off x="1765080" y="225720"/>
-            <a:ext cx="6592680" cy="946800"/>
+            <a:off x="2880000" y="900000"/>
+            <a:ext cx="4320000" cy="1080000"/>
           </a:xfrm>
           <a:prstGeom prst="rect">
             <a:avLst/>
@@ -13551,6 +13587,15 @@
             <a:pPr indent="0" algn="ctr">
               <a:buNone/>
             </a:pPr>
+            <a:r>
+              <a:rPr b="0" lang="en-US" sz="2100" spc="-1" strike="noStrike">
+                <a:solidFill>
+                  <a:srgbClr val="333333"/>
+                </a:solidFill>
+                <a:latin typeface="DejaVu Sans"/>
+              </a:rPr>
+              <a:t>Use Cases</a:t>
+            </a:r>
             <a:endParaRPr b="0" lang="en-US" sz="2100" spc="-1" strike="noStrike">
               <a:solidFill>
                 <a:srgbClr val="333333"/>
@@ -13560,44 +13605,77 @@
           </a:p>
         </p:txBody>
       </p:sp>
-      <p:pic>
-        <p:nvPicPr>
-          <p:cNvPr id="191" name="" descr=""/>
-          <p:cNvPicPr/>
-          <p:nvPr/>
-        </p:nvPicPr>
-        <p:blipFill>
-          <a:blip r:embed="rId1"/>
-          <a:stretch/>
-        </p:blipFill>
-        <p:spPr>
-          <a:xfrm>
-            <a:off x="1496880" y="0"/>
-            <a:ext cx="7086600" cy="5735880"/>
-          </a:xfrm>
-          <a:prstGeom prst="rect">
-            <a:avLst/>
-          </a:prstGeom>
-          <a:ln w="18000">
-            <a:noFill/>
-          </a:ln>
-        </p:spPr>
-      </p:pic>
-      <p:sp>
-        <p:nvSpPr>
-          <p:cNvPr id="3" name="PlaceHolder 2"/>
-          <p:cNvSpPr>
-            <a:spLocks noGrp="1"/>
-          </p:cNvSpPr>
-          <p:nvPr>
-            <p:ph type="sldNum" idx="9"/>
+      <p:sp>
+        <p:nvSpPr>
+          <p:cNvPr id="191" name="PlaceHolder 2"/>
+          <p:cNvSpPr>
+            <a:spLocks noGrp="1"/>
+          </p:cNvSpPr>
+          <p:nvPr>
+            <p:ph/>
+          </p:nvPr>
+        </p:nvSpPr>
+        <p:spPr>
+          <a:xfrm>
+            <a:off x="2022480" y="1747800"/>
+            <a:ext cx="6035400" cy="3510000"/>
+          </a:xfrm>
+          <a:prstGeom prst="rect">
+            <a:avLst/>
+          </a:prstGeom>
+          <a:solidFill>
+            <a:srgbClr val="ffffff">
+              <a:alpha val="50000"/>
+            </a:srgbClr>
+          </a:solidFill>
+          <a:ln w="0">
+            <a:noFill/>
+          </a:ln>
+        </p:spPr>
+        <p:txBody>
+          <a:bodyPr lIns="0" rIns="0" tIns="0" bIns="0" anchor="t">
+            <a:normAutofit fontScale="90000"/>
+          </a:bodyPr>
+          <a:p>
+            <a:pPr marL="388800" indent="0" algn="ctr">
+              <a:spcAft>
+                <a:spcPts val="1060"/>
+              </a:spcAft>
+              <a:buNone/>
+            </a:pPr>
+            <a:r>
+              <a:rPr b="0" lang="en-US" sz="2000" spc="-1" strike="noStrike">
+                <a:solidFill>
+                  <a:srgbClr val="666666"/>
+                </a:solidFill>
+                <a:latin typeface="DejaVu Sans"/>
+              </a:rPr>
+              <a:t>Many owners of small restaurants still utilize manual methods of tracking orders. While this can be effective for smaller businesses, they can leave room for errors as demand grows, which can cause confusion within staff and potentially cost precious time or money. Applications exist to track orders, but many of them require the user to undergo specialized training or use proprietary hardware in order to use them effectively. OrderMaster is a simple, intuitive web application that can be accessed from most modern devices, cutting out the time and money needed to invest in these high upfront costs.</a:t>
+            </a:r>
+            <a:endParaRPr b="0" lang="en-US" sz="2000" spc="-1" strike="noStrike">
+              <a:solidFill>
+                <a:srgbClr val="666666"/>
+              </a:solidFill>
+              <a:latin typeface="DejaVu Sans"/>
+            </a:endParaRPr>
+          </a:p>
+        </p:txBody>
+      </p:sp>
+      <p:sp>
+        <p:nvSpPr>
+          <p:cNvPr id="4" name="PlaceHolder 3"/>
+          <p:cNvSpPr>
+            <a:spLocks noGrp="1"/>
+          </p:cNvSpPr>
+          <p:nvPr>
+            <p:ph type="sldNum" idx="6"/>
           </p:nvPr>
         </p:nvSpPr>
         <p:spPr/>
         <p:txBody>
           <a:bodyPr/>
           <a:p>
-            <a:fld id="{28FD7716-F730-4FE1-B655-952F1A1D5A59}" type="slidenum">
+            <a:fld id="{DF54EB7D-361A-42FC-8C08-3C7AE4059132}" type="slidenum">
               <a:t>3</a:t>
             </a:fld>
           </a:p>
@@ -13645,8 +13723,8 @@
         </p:nvSpPr>
         <p:spPr>
           <a:xfrm>
-            <a:off x="732600" y="-214200"/>
-            <a:ext cx="8640000" cy="900000"/>
+            <a:off x="1765080" y="225720"/>
+            <a:ext cx="6592680" cy="946800"/>
           </a:xfrm>
           <a:prstGeom prst="rect">
             <a:avLst/>
@@ -13664,61 +13742,9 @@
             <a:pPr indent="0" algn="ctr">
               <a:buNone/>
             </a:pPr>
-            <a:r>
-              <a:rPr b="0" lang="en-US" sz="3000" spc="-1" strike="noStrike">
-                <a:solidFill>
-                  <a:srgbClr val="333333"/>
-                </a:solidFill>
-                <a:latin typeface="DejaVu Sans"/>
-              </a:rPr>
-              <a:t>Homepage</a:t>
-            </a:r>
-            <a:endParaRPr b="0" lang="en-US" sz="3000" spc="-1" strike="noStrike">
+            <a:endParaRPr b="0" lang="en-US" sz="2100" spc="-1" strike="noStrike">
               <a:solidFill>
                 <a:srgbClr val="333333"/>
-              </a:solidFill>
-              <a:latin typeface="DejaVu Sans"/>
-            </a:endParaRPr>
-          </a:p>
-        </p:txBody>
-      </p:sp>
-      <p:sp>
-        <p:nvSpPr>
-          <p:cNvPr id="193" name="PlaceHolder 2"/>
-          <p:cNvSpPr>
-            <a:spLocks noGrp="1"/>
-          </p:cNvSpPr>
-          <p:nvPr>
-            <p:ph/>
-          </p:nvPr>
-        </p:nvSpPr>
-        <p:spPr>
-          <a:xfrm>
-            <a:off x="720000" y="1440000"/>
-            <a:ext cx="8640000" cy="3600000"/>
-          </a:xfrm>
-          <a:prstGeom prst="rect">
-            <a:avLst/>
-          </a:prstGeom>
-          <a:noFill/>
-          <a:ln w="0">
-            <a:noFill/>
-          </a:ln>
-        </p:spPr>
-        <p:txBody>
-          <a:bodyPr lIns="0" rIns="0" tIns="0" bIns="0" anchor="t">
-            <a:normAutofit/>
-          </a:bodyPr>
-          <a:p>
-            <a:pPr indent="0">
-              <a:spcAft>
-                <a:spcPts val="1060"/>
-              </a:spcAft>
-              <a:buNone/>
-            </a:pPr>
-            <a:endParaRPr b="0" lang="en-US" sz="2400" spc="-1" strike="noStrike">
-              <a:solidFill>
-                <a:srgbClr val="666666"/>
               </a:solidFill>
               <a:latin typeface="DejaVu Sans"/>
             </a:endParaRPr>
@@ -13727,7 +13753,7 @@
       </p:sp>
       <p:pic>
         <p:nvPicPr>
-          <p:cNvPr id="194" name="" descr=""/>
+          <p:cNvPr id="193" name="" descr=""/>
           <p:cNvPicPr/>
           <p:nvPr/>
         </p:nvPicPr>
@@ -13737,8 +13763,8 @@
         </p:blipFill>
         <p:spPr>
           <a:xfrm>
-            <a:off x="16200" y="612000"/>
-            <a:ext cx="10079640" cy="4491360"/>
+            <a:off x="1496880" y="0"/>
+            <a:ext cx="7086600" cy="5735880"/>
           </a:xfrm>
           <a:prstGeom prst="rect">
             <a:avLst/>
@@ -13750,105 +13776,19 @@
       </p:pic>
       <p:sp>
         <p:nvSpPr>
-          <p:cNvPr id="195" name=""/>
-          <p:cNvSpPr/>
-          <p:nvPr/>
-        </p:nvSpPr>
-        <p:spPr>
-          <a:xfrm>
-            <a:off x="457200" y="2743200"/>
-            <a:ext cx="2057400" cy="1742040"/>
-          </a:xfrm>
-          <a:prstGeom prst="rect">
-            <a:avLst/>
-          </a:prstGeom>
-          <a:noFill/>
-          <a:ln w="18000">
-            <a:noFill/>
-          </a:ln>
-        </p:spPr>
-        <p:style>
-          <a:lnRef idx="0"/>
-          <a:fillRef idx="0"/>
-          <a:effectRef idx="0"/>
-          <a:fontRef idx="minor"/>
-        </p:style>
-        <p:txBody>
-          <a:bodyPr wrap="none" lIns="90000" rIns="90000" tIns="45000" bIns="45000" anchor="ctr">
-            <a:noAutofit/>
-          </a:bodyPr>
-          <a:p>
-            <a:endParaRPr b="0" lang="en-US" sz="1800" spc="-1" strike="noStrike">
-              <a:solidFill>
-                <a:srgbClr val="000000"/>
-              </a:solidFill>
-              <a:latin typeface="DejaVu Sans"/>
-            </a:endParaRPr>
-          </a:p>
-        </p:txBody>
-      </p:sp>
-      <p:sp>
-        <p:nvSpPr>
-          <p:cNvPr id="196" name=""/>
-          <p:cNvSpPr txBox="1"/>
-          <p:nvPr/>
-        </p:nvSpPr>
-        <p:spPr>
-          <a:xfrm>
-            <a:off x="7086600" y="1828800"/>
-            <a:ext cx="2743200" cy="1416960"/>
-          </a:xfrm>
-          <a:prstGeom prst="rect">
-            <a:avLst/>
-          </a:prstGeom>
-          <a:noFill/>
-          <a:ln w="18000">
-            <a:noFill/>
-          </a:ln>
-        </p:spPr>
-        <p:txBody>
-          <a:bodyPr lIns="90000" rIns="90000" tIns="45000" bIns="45000" anchor="t">
-            <a:noAutofit/>
-          </a:bodyPr>
-          <a:p>
-            <a:pPr algn="ctr">
-              <a:lnSpc>
-                <a:spcPct val="100000"/>
-              </a:lnSpc>
-            </a:pPr>
-            <a:r>
-              <a:rPr b="0" lang="en-US" sz="1800" spc="-1" strike="noStrike">
-                <a:solidFill>
-                  <a:srgbClr val="000000"/>
-                </a:solidFill>
-                <a:latin typeface="DejaVu Sans"/>
-              </a:rPr>
-              <a:t>Tables are represented here – the user can click on a table to go to its current active order</a:t>
-            </a:r>
-            <a:endParaRPr b="0" lang="en-US" sz="1800" spc="-1" strike="noStrike">
-              <a:solidFill>
-                <a:srgbClr val="000000"/>
-              </a:solidFill>
-              <a:latin typeface="DejaVu Sans"/>
-            </a:endParaRPr>
-          </a:p>
-        </p:txBody>
-      </p:sp>
-      <p:sp>
-        <p:nvSpPr>
-          <p:cNvPr id="4" name="PlaceHolder 3"/>
-          <p:cNvSpPr>
-            <a:spLocks noGrp="1"/>
-          </p:cNvSpPr>
-          <p:nvPr>
-            <p:ph type="sldNum" idx="12"/>
+          <p:cNvPr id="3" name="PlaceHolder 2"/>
+          <p:cNvSpPr>
+            <a:spLocks noGrp="1"/>
+          </p:cNvSpPr>
+          <p:nvPr>
+            <p:ph type="sldNum" idx="9"/>
           </p:nvPr>
         </p:nvSpPr>
         <p:spPr/>
         <p:txBody>
           <a:bodyPr/>
           <a:p>
-            <a:fld id="{3B83FB3E-97C3-4B35-A012-E6986E0A8FBD}" type="slidenum">
+            <a:fld id="{67472DE9-C90F-404D-8047-F589CA37C830}" type="slidenum">
               <a:t>4</a:t>
             </a:fld>
           </a:p>
@@ -13886,7 +13826,258 @@
       </p:grpSpPr>
       <p:sp>
         <p:nvSpPr>
-          <p:cNvPr id="197" name="PlaceHolder 1"/>
+          <p:cNvPr id="194" name="PlaceHolder 1"/>
+          <p:cNvSpPr>
+            <a:spLocks noGrp="1"/>
+          </p:cNvSpPr>
+          <p:nvPr>
+            <p:ph type="title"/>
+          </p:nvPr>
+        </p:nvSpPr>
+        <p:spPr>
+          <a:xfrm>
+            <a:off x="732600" y="-214200"/>
+            <a:ext cx="8640000" cy="900000"/>
+          </a:xfrm>
+          <a:prstGeom prst="rect">
+            <a:avLst/>
+          </a:prstGeom>
+          <a:noFill/>
+          <a:ln w="0">
+            <a:noFill/>
+          </a:ln>
+        </p:spPr>
+        <p:txBody>
+          <a:bodyPr lIns="0" rIns="0" tIns="0" bIns="0" anchor="ctr">
+            <a:noAutofit/>
+          </a:bodyPr>
+          <a:p>
+            <a:pPr indent="0" algn="ctr">
+              <a:buNone/>
+            </a:pPr>
+            <a:r>
+              <a:rPr b="0" lang="en-US" sz="3000" spc="-1" strike="noStrike">
+                <a:solidFill>
+                  <a:srgbClr val="333333"/>
+                </a:solidFill>
+                <a:latin typeface="DejaVu Sans"/>
+              </a:rPr>
+              <a:t>Homepage</a:t>
+            </a:r>
+            <a:endParaRPr b="0" lang="en-US" sz="3000" spc="-1" strike="noStrike">
+              <a:solidFill>
+                <a:srgbClr val="333333"/>
+              </a:solidFill>
+              <a:latin typeface="DejaVu Sans"/>
+            </a:endParaRPr>
+          </a:p>
+        </p:txBody>
+      </p:sp>
+      <p:sp>
+        <p:nvSpPr>
+          <p:cNvPr id="195" name="PlaceHolder 2"/>
+          <p:cNvSpPr>
+            <a:spLocks noGrp="1"/>
+          </p:cNvSpPr>
+          <p:nvPr>
+            <p:ph/>
+          </p:nvPr>
+        </p:nvSpPr>
+        <p:spPr>
+          <a:xfrm>
+            <a:off x="720000" y="1440000"/>
+            <a:ext cx="8640000" cy="3600000"/>
+          </a:xfrm>
+          <a:prstGeom prst="rect">
+            <a:avLst/>
+          </a:prstGeom>
+          <a:noFill/>
+          <a:ln w="0">
+            <a:noFill/>
+          </a:ln>
+        </p:spPr>
+        <p:txBody>
+          <a:bodyPr lIns="0" rIns="0" tIns="0" bIns="0" anchor="t">
+            <a:normAutofit/>
+          </a:bodyPr>
+          <a:p>
+            <a:pPr indent="0">
+              <a:spcAft>
+                <a:spcPts val="1060"/>
+              </a:spcAft>
+              <a:buNone/>
+            </a:pPr>
+            <a:endParaRPr b="0" lang="en-US" sz="2400" spc="-1" strike="noStrike">
+              <a:solidFill>
+                <a:srgbClr val="666666"/>
+              </a:solidFill>
+              <a:latin typeface="DejaVu Sans"/>
+            </a:endParaRPr>
+          </a:p>
+        </p:txBody>
+      </p:sp>
+      <p:pic>
+        <p:nvPicPr>
+          <p:cNvPr id="196" name="" descr=""/>
+          <p:cNvPicPr/>
+          <p:nvPr/>
+        </p:nvPicPr>
+        <p:blipFill>
+          <a:blip r:embed="rId1"/>
+          <a:stretch/>
+        </p:blipFill>
+        <p:spPr>
+          <a:xfrm>
+            <a:off x="16200" y="612000"/>
+            <a:ext cx="10079640" cy="4491360"/>
+          </a:xfrm>
+          <a:prstGeom prst="rect">
+            <a:avLst/>
+          </a:prstGeom>
+          <a:ln w="18000">
+            <a:noFill/>
+          </a:ln>
+        </p:spPr>
+      </p:pic>
+      <p:sp>
+        <p:nvSpPr>
+          <p:cNvPr id="197" name=""/>
+          <p:cNvSpPr/>
+          <p:nvPr/>
+        </p:nvSpPr>
+        <p:spPr>
+          <a:xfrm>
+            <a:off x="457200" y="2743200"/>
+            <a:ext cx="2057400" cy="1742040"/>
+          </a:xfrm>
+          <a:prstGeom prst="rect">
+            <a:avLst/>
+          </a:prstGeom>
+          <a:noFill/>
+          <a:ln w="18000">
+            <a:noFill/>
+          </a:ln>
+        </p:spPr>
+        <p:style>
+          <a:lnRef idx="0"/>
+          <a:fillRef idx="0"/>
+          <a:effectRef idx="0"/>
+          <a:fontRef idx="minor"/>
+        </p:style>
+        <p:txBody>
+          <a:bodyPr wrap="none" lIns="90000" rIns="90000" tIns="45000" bIns="45000" anchor="ctr">
+            <a:noAutofit/>
+          </a:bodyPr>
+          <a:p>
+            <a:endParaRPr b="0" lang="en-US" sz="1800" spc="-1" strike="noStrike">
+              <a:solidFill>
+                <a:srgbClr val="000000"/>
+              </a:solidFill>
+              <a:latin typeface="DejaVu Sans"/>
+            </a:endParaRPr>
+          </a:p>
+        </p:txBody>
+      </p:sp>
+      <p:sp>
+        <p:nvSpPr>
+          <p:cNvPr id="198" name=""/>
+          <p:cNvSpPr txBox="1"/>
+          <p:nvPr/>
+        </p:nvSpPr>
+        <p:spPr>
+          <a:xfrm>
+            <a:off x="7086600" y="1828800"/>
+            <a:ext cx="2743200" cy="1416960"/>
+          </a:xfrm>
+          <a:prstGeom prst="rect">
+            <a:avLst/>
+          </a:prstGeom>
+          <a:noFill/>
+          <a:ln w="18000">
+            <a:noFill/>
+          </a:ln>
+        </p:spPr>
+        <p:txBody>
+          <a:bodyPr lIns="90000" rIns="90000" tIns="45000" bIns="45000" anchor="t">
+            <a:noAutofit/>
+          </a:bodyPr>
+          <a:p>
+            <a:pPr algn="ctr">
+              <a:lnSpc>
+                <a:spcPct val="100000"/>
+              </a:lnSpc>
+            </a:pPr>
+            <a:r>
+              <a:rPr b="0" lang="en-US" sz="1800" spc="-1" strike="noStrike">
+                <a:solidFill>
+                  <a:srgbClr val="000000"/>
+                </a:solidFill>
+                <a:latin typeface="DejaVu Sans"/>
+              </a:rPr>
+              <a:t>Tables are represented here – the user can click on a table to go to its current active order</a:t>
+            </a:r>
+            <a:endParaRPr b="0" lang="en-US" sz="1800" spc="-1" strike="noStrike">
+              <a:solidFill>
+                <a:srgbClr val="000000"/>
+              </a:solidFill>
+              <a:latin typeface="DejaVu Sans"/>
+            </a:endParaRPr>
+          </a:p>
+        </p:txBody>
+      </p:sp>
+      <p:sp>
+        <p:nvSpPr>
+          <p:cNvPr id="4" name="PlaceHolder 3"/>
+          <p:cNvSpPr>
+            <a:spLocks noGrp="1"/>
+          </p:cNvSpPr>
+          <p:nvPr>
+            <p:ph type="sldNum" idx="12"/>
+          </p:nvPr>
+        </p:nvSpPr>
+        <p:spPr/>
+        <p:txBody>
+          <a:bodyPr/>
+          <a:p>
+            <a:fld id="{54C739E4-8BAE-469D-8697-A3BC5C652B53}" type="slidenum">
+              <a:t>5</a:t>
+            </a:fld>
+          </a:p>
+        </p:txBody>
+      </p:sp>
+    </p:spTree>
+  </p:cSld>
+  <mc:AlternateContent>
+    <mc:Choice Requires="p14">
+      <p:transition spd="slow" p14:dur="2000"/>
+    </mc:Choice>
+    <mc:Fallback>
+      <p:transition spd="slow"/>
+    </mc:Fallback>
+  </mc:AlternateContent>
+</p:sld>
+</file>
+
+<file path=ppt/slides/slide6.xml><?xml version="1.0" encoding="utf-8"?>
+<p:sld xmlns:a="http://schemas.openxmlformats.org/drawingml/2006/main" xmlns:p="http://schemas.openxmlformats.org/presentationml/2006/main" xmlns:r="http://schemas.openxmlformats.org/officeDocument/2006/relationships" xmlns:p14="http://schemas.microsoft.com/office/powerpoint/2010/main" xmlns:p15="http://schemas.microsoft.com/office/powerpoint/2012/main" xmlns:mc="http://schemas.openxmlformats.org/markup-compatibility/2006">
+  <p:cSld>
+    <p:spTree>
+      <p:nvGrpSpPr>
+        <p:cNvPr id="1" name=""/>
+        <p:cNvGrpSpPr/>
+        <p:nvPr/>
+      </p:nvGrpSpPr>
+      <p:grpSpPr>
+        <a:xfrm>
+          <a:off x="0" y="0"/>
+          <a:ext cx="0" cy="0"/>
+          <a:chOff x="0" y="0"/>
+          <a:chExt cx="0" cy="0"/>
+        </a:xfrm>
+      </p:grpSpPr>
+      <p:sp>
+        <p:nvSpPr>
+          <p:cNvPr id="199" name="PlaceHolder 1"/>
           <p:cNvSpPr>
             <a:spLocks noGrp="1"/>
           </p:cNvSpPr>
@@ -13935,7 +14126,7 @@
       </p:sp>
       <p:sp>
         <p:nvSpPr>
-          <p:cNvPr id="198" name="PlaceHolder 2"/>
+          <p:cNvPr id="200" name="PlaceHolder 2"/>
           <p:cNvSpPr>
             <a:spLocks noGrp="1"/>
           </p:cNvSpPr>
@@ -13978,7 +14169,7 @@
       </p:sp>
       <p:pic>
         <p:nvPicPr>
-          <p:cNvPr id="199" name="" descr=""/>
+          <p:cNvPr id="201" name="" descr=""/>
           <p:cNvPicPr/>
           <p:nvPr/>
         </p:nvPicPr>
@@ -14001,7 +14192,7 @@
       </p:pic>
       <p:sp>
         <p:nvSpPr>
-          <p:cNvPr id="200" name=""/>
+          <p:cNvPr id="202" name=""/>
           <p:cNvSpPr txBox="1"/>
           <p:nvPr/>
         </p:nvSpPr>
@@ -14043,7 +14234,7 @@
       </p:sp>
       <p:sp>
         <p:nvSpPr>
-          <p:cNvPr id="201" name=""/>
+          <p:cNvPr id="203" name=""/>
           <p:cNvSpPr txBox="1"/>
           <p:nvPr/>
         </p:nvSpPr>
@@ -14085,7 +14276,7 @@
       </p:sp>
       <p:sp>
         <p:nvSpPr>
-          <p:cNvPr id="202" name=""/>
+          <p:cNvPr id="204" name=""/>
           <p:cNvSpPr txBox="1"/>
           <p:nvPr/>
         </p:nvSpPr>
@@ -14139,8 +14330,8 @@
         <p:txBody>
           <a:bodyPr/>
           <a:p>
-            <a:fld id="{E9CDC131-0D5D-4F33-8F32-57F3C304826F}" type="slidenum">
-              <a:t>5</a:t>
+            <a:fld id="{32F5754C-C9A1-4228-80AE-BC54B1998504}" type="slidenum">
+              <a:t>6</a:t>
             </a:fld>
           </a:p>
         </p:txBody>

</xml_diff>